<commit_message>
thesis ukr: pics done
</commit_message>
<xml_diff>
--- a/presentations_posters/schemas_ukr.pptx
+++ b/presentations_posters/schemas_ukr.pptx
@@ -7,6 +7,7 @@
   <p:sldIdLst>
     <p:sldId id="256" r:id="rId2"/>
     <p:sldId id="257" r:id="rId3"/>
+    <p:sldId id="258" r:id="rId4"/>
   </p:sldIdLst>
   <p:sldSz cx="12193588" cy="18000663"/>
   <p:notesSz cx="6858000" cy="9144000"/>
@@ -105,6 +106,11 @@
       </a:defRPr>
     </a:lvl9pPr>
   </p:defaultTextStyle>
+  <p:extLst>
+    <p:ext uri="{EFAFB233-063F-42B5-8137-9DF3F51BA10A}">
+      <p15:sldGuideLst xmlns:p15="http://schemas.microsoft.com/office/powerpoint/2012/main"/>
+    </p:ext>
+  </p:extLst>
 </p:presentation>
 </file>
 
@@ -239,7 +245,7 @@
           <a:p>
             <a:fld id="{0AA9161A-D89C-EF43-8E7B-61C797291AA3}" type="datetimeFigureOut">
               <a:rPr lang="en-US" smtClean="0"/>
-              <a:t>5/25/18</a:t>
+              <a:t>5/29/18</a:t>
             </a:fld>
             <a:endParaRPr lang="en-US"/>
           </a:p>
@@ -409,7 +415,7 @@
           <a:p>
             <a:fld id="{0AA9161A-D89C-EF43-8E7B-61C797291AA3}" type="datetimeFigureOut">
               <a:rPr lang="en-US" smtClean="0"/>
-              <a:t>5/25/18</a:t>
+              <a:t>5/29/18</a:t>
             </a:fld>
             <a:endParaRPr lang="en-US"/>
           </a:p>
@@ -589,7 +595,7 @@
           <a:p>
             <a:fld id="{0AA9161A-D89C-EF43-8E7B-61C797291AA3}" type="datetimeFigureOut">
               <a:rPr lang="en-US" smtClean="0"/>
-              <a:t>5/25/18</a:t>
+              <a:t>5/29/18</a:t>
             </a:fld>
             <a:endParaRPr lang="en-US"/>
           </a:p>
@@ -759,7 +765,7 @@
           <a:p>
             <a:fld id="{0AA9161A-D89C-EF43-8E7B-61C797291AA3}" type="datetimeFigureOut">
               <a:rPr lang="en-US" smtClean="0"/>
-              <a:t>5/25/18</a:t>
+              <a:t>5/29/18</a:t>
             </a:fld>
             <a:endParaRPr lang="en-US"/>
           </a:p>
@@ -1003,7 +1009,7 @@
           <a:p>
             <a:fld id="{0AA9161A-D89C-EF43-8E7B-61C797291AA3}" type="datetimeFigureOut">
               <a:rPr lang="en-US" smtClean="0"/>
-              <a:t>5/25/18</a:t>
+              <a:t>5/29/18</a:t>
             </a:fld>
             <a:endParaRPr lang="en-US"/>
           </a:p>
@@ -1235,7 +1241,7 @@
           <a:p>
             <a:fld id="{0AA9161A-D89C-EF43-8E7B-61C797291AA3}" type="datetimeFigureOut">
               <a:rPr lang="en-US" smtClean="0"/>
-              <a:t>5/25/18</a:t>
+              <a:t>5/29/18</a:t>
             </a:fld>
             <a:endParaRPr lang="en-US"/>
           </a:p>
@@ -1602,7 +1608,7 @@
           <a:p>
             <a:fld id="{0AA9161A-D89C-EF43-8E7B-61C797291AA3}" type="datetimeFigureOut">
               <a:rPr lang="en-US" smtClean="0"/>
-              <a:t>5/25/18</a:t>
+              <a:t>5/29/18</a:t>
             </a:fld>
             <a:endParaRPr lang="en-US"/>
           </a:p>
@@ -1720,7 +1726,7 @@
           <a:p>
             <a:fld id="{0AA9161A-D89C-EF43-8E7B-61C797291AA3}" type="datetimeFigureOut">
               <a:rPr lang="en-US" smtClean="0"/>
-              <a:t>5/25/18</a:t>
+              <a:t>5/29/18</a:t>
             </a:fld>
             <a:endParaRPr lang="en-US"/>
           </a:p>
@@ -1815,7 +1821,7 @@
           <a:p>
             <a:fld id="{0AA9161A-D89C-EF43-8E7B-61C797291AA3}" type="datetimeFigureOut">
               <a:rPr lang="en-US" smtClean="0"/>
-              <a:t>5/25/18</a:t>
+              <a:t>5/29/18</a:t>
             </a:fld>
             <a:endParaRPr lang="en-US"/>
           </a:p>
@@ -2092,7 +2098,7 @@
           <a:p>
             <a:fld id="{0AA9161A-D89C-EF43-8E7B-61C797291AA3}" type="datetimeFigureOut">
               <a:rPr lang="en-US" smtClean="0"/>
-              <a:t>5/25/18</a:t>
+              <a:t>5/29/18</a:t>
             </a:fld>
             <a:endParaRPr lang="en-US"/>
           </a:p>
@@ -2349,7 +2355,7 @@
           <a:p>
             <a:fld id="{0AA9161A-D89C-EF43-8E7B-61C797291AA3}" type="datetimeFigureOut">
               <a:rPr lang="en-US" smtClean="0"/>
-              <a:t>5/25/18</a:t>
+              <a:t>5/29/18</a:t>
             </a:fld>
             <a:endParaRPr lang="en-US"/>
           </a:p>
@@ -2562,7 +2568,7 @@
           <a:p>
             <a:fld id="{0AA9161A-D89C-EF43-8E7B-61C797291AA3}" type="datetimeFigureOut">
               <a:rPr lang="en-US" smtClean="0"/>
-              <a:t>5/25/18</a:t>
+              <a:t>5/29/18</a:t>
             </a:fld>
             <a:endParaRPr lang="en-US"/>
           </a:p>
@@ -5535,6 +5541,570 @@
 </p:sld>
 </file>
 
+<file path=ppt/slides/slide3.xml><?xml version="1.0" encoding="utf-8"?>
+<p:sld xmlns:a="http://schemas.openxmlformats.org/drawingml/2006/main" xmlns:r="http://schemas.openxmlformats.org/officeDocument/2006/relationships" xmlns:p="http://schemas.openxmlformats.org/presentationml/2006/main">
+  <p:cSld>
+    <p:spTree>
+      <p:nvGrpSpPr>
+        <p:cNvPr id="1" name=""/>
+        <p:cNvGrpSpPr/>
+        <p:nvPr/>
+      </p:nvGrpSpPr>
+      <p:grpSpPr>
+        <a:xfrm>
+          <a:off x="0" y="0"/>
+          <a:ext cx="0" cy="0"/>
+          <a:chOff x="0" y="0"/>
+          <a:chExt cx="0" cy="0"/>
+        </a:xfrm>
+      </p:grpSpPr>
+      <p:grpSp>
+        <p:nvGrpSpPr>
+          <p:cNvPr id="18" name="Group 17">
+            <a:extLst>
+              <a:ext uri="{FF2B5EF4-FFF2-40B4-BE49-F238E27FC236}">
+                <a16:creationId xmlns:a16="http://schemas.microsoft.com/office/drawing/2014/main" id="{D356F484-B956-8B40-96DC-CE6C0FF7833A}"/>
+              </a:ext>
+            </a:extLst>
+          </p:cNvPr>
+          <p:cNvGrpSpPr/>
+          <p:nvPr/>
+        </p:nvGrpSpPr>
+        <p:grpSpPr>
+          <a:xfrm>
+            <a:off x="1944409" y="3184245"/>
+            <a:ext cx="6655894" cy="9057715"/>
+            <a:chOff x="1944409" y="3184245"/>
+            <a:chExt cx="6655894" cy="9057715"/>
+          </a:xfrm>
+        </p:grpSpPr>
+        <p:pic>
+          <p:nvPicPr>
+            <p:cNvPr id="5" name="Picture 4">
+              <a:extLst>
+                <a:ext uri="{FF2B5EF4-FFF2-40B4-BE49-F238E27FC236}">
+                  <a16:creationId xmlns:a16="http://schemas.microsoft.com/office/drawing/2014/main" id="{23A4F5A9-0BB6-3545-BB86-85357BB5E810}"/>
+                </a:ext>
+              </a:extLst>
+            </p:cNvPr>
+            <p:cNvPicPr>
+              <a:picLocks noChangeAspect="1"/>
+            </p:cNvPicPr>
+            <p:nvPr/>
+          </p:nvPicPr>
+          <p:blipFill>
+            <a:blip r:embed="rId2"/>
+            <a:stretch>
+              <a:fillRect/>
+            </a:stretch>
+          </p:blipFill>
+          <p:spPr>
+            <a:xfrm>
+              <a:off x="1944409" y="3184245"/>
+              <a:ext cx="6655894" cy="9057715"/>
+            </a:xfrm>
+            <a:prstGeom prst="rect">
+              <a:avLst/>
+            </a:prstGeom>
+          </p:spPr>
+        </p:pic>
+        <p:sp>
+          <p:nvSpPr>
+            <p:cNvPr id="6" name="TextBox 5">
+              <a:extLst>
+                <a:ext uri="{FF2B5EF4-FFF2-40B4-BE49-F238E27FC236}">
+                  <a16:creationId xmlns:a16="http://schemas.microsoft.com/office/drawing/2014/main" id="{D48E5BC1-54A2-334B-B221-93FD0FD3071B}"/>
+                </a:ext>
+              </a:extLst>
+            </p:cNvPr>
+            <p:cNvSpPr txBox="1"/>
+            <p:nvPr/>
+          </p:nvSpPr>
+          <p:spPr>
+            <a:xfrm>
+              <a:off x="2590800" y="5143500"/>
+              <a:ext cx="1503360" cy="583686"/>
+            </a:xfrm>
+            <a:prstGeom prst="rect">
+              <a:avLst/>
+            </a:prstGeom>
+            <a:solidFill>
+              <a:schemeClr val="bg1"/>
+            </a:solidFill>
+          </p:spPr>
+          <p:txBody>
+            <a:bodyPr wrap="none" rtlCol="0">
+              <a:spAutoFit/>
+            </a:bodyPr>
+            <a:lstStyle/>
+            <a:p>
+              <a:r>
+                <a:rPr lang="uk-UA" dirty="0">
+                  <a:latin typeface="Times New Roman" panose="02020603050405020304" pitchFamily="18" charset="0"/>
+                  <a:cs typeface="Times New Roman" panose="02020603050405020304" pitchFamily="18" charset="0"/>
+                </a:rPr>
+                <a:t>протеїн</a:t>
+              </a:r>
+              <a:endParaRPr lang="en-US" dirty="0">
+                <a:latin typeface="Times New Roman" panose="02020603050405020304" pitchFamily="18" charset="0"/>
+                <a:cs typeface="Times New Roman" panose="02020603050405020304" pitchFamily="18" charset="0"/>
+              </a:endParaRPr>
+            </a:p>
+          </p:txBody>
+        </p:sp>
+        <p:sp>
+          <p:nvSpPr>
+            <p:cNvPr id="7" name="TextBox 6">
+              <a:extLst>
+                <a:ext uri="{FF2B5EF4-FFF2-40B4-BE49-F238E27FC236}">
+                  <a16:creationId xmlns:a16="http://schemas.microsoft.com/office/drawing/2014/main" id="{BF6D4977-D9E0-CD42-A12C-234F51465D31}"/>
+                </a:ext>
+              </a:extLst>
+            </p:cNvPr>
+            <p:cNvSpPr txBox="1"/>
+            <p:nvPr/>
+          </p:nvSpPr>
+          <p:spPr>
+            <a:xfrm>
+              <a:off x="6007100" y="5143500"/>
+              <a:ext cx="1503360" cy="583686"/>
+            </a:xfrm>
+            <a:prstGeom prst="rect">
+              <a:avLst/>
+            </a:prstGeom>
+            <a:solidFill>
+              <a:schemeClr val="bg1"/>
+            </a:solidFill>
+          </p:spPr>
+          <p:txBody>
+            <a:bodyPr wrap="none" rtlCol="0">
+              <a:spAutoFit/>
+            </a:bodyPr>
+            <a:lstStyle/>
+            <a:p>
+              <a:r>
+                <a:rPr lang="uk-UA" dirty="0">
+                  <a:latin typeface="Times New Roman" panose="02020603050405020304" pitchFamily="18" charset="0"/>
+                  <a:cs typeface="Times New Roman" panose="02020603050405020304" pitchFamily="18" charset="0"/>
+                </a:rPr>
+                <a:t>протеїн</a:t>
+              </a:r>
+              <a:endParaRPr lang="en-US" dirty="0">
+                <a:latin typeface="Times New Roman" panose="02020603050405020304" pitchFamily="18" charset="0"/>
+                <a:cs typeface="Times New Roman" panose="02020603050405020304" pitchFamily="18" charset="0"/>
+              </a:endParaRPr>
+            </a:p>
+          </p:txBody>
+        </p:sp>
+        <p:sp>
+          <p:nvSpPr>
+            <p:cNvPr id="8" name="TextBox 7">
+              <a:extLst>
+                <a:ext uri="{FF2B5EF4-FFF2-40B4-BE49-F238E27FC236}">
+                  <a16:creationId xmlns:a16="http://schemas.microsoft.com/office/drawing/2014/main" id="{F1DC4C77-4F20-7B4E-93B0-D276B2A10159}"/>
+                </a:ext>
+              </a:extLst>
+            </p:cNvPr>
+            <p:cNvSpPr txBox="1"/>
+            <p:nvPr/>
+          </p:nvSpPr>
+          <p:spPr>
+            <a:xfrm>
+              <a:off x="5969000" y="6604000"/>
+              <a:ext cx="1503360" cy="583686"/>
+            </a:xfrm>
+            <a:prstGeom prst="rect">
+              <a:avLst/>
+            </a:prstGeom>
+            <a:solidFill>
+              <a:schemeClr val="bg1"/>
+            </a:solidFill>
+          </p:spPr>
+          <p:txBody>
+            <a:bodyPr wrap="none" rtlCol="0">
+              <a:spAutoFit/>
+            </a:bodyPr>
+            <a:lstStyle/>
+            <a:p>
+              <a:r>
+                <a:rPr lang="uk-UA" dirty="0">
+                  <a:latin typeface="Times New Roman" panose="02020603050405020304" pitchFamily="18" charset="0"/>
+                  <a:cs typeface="Times New Roman" panose="02020603050405020304" pitchFamily="18" charset="0"/>
+                </a:rPr>
+                <a:t>протеїн</a:t>
+              </a:r>
+              <a:endParaRPr lang="en-US" dirty="0">
+                <a:latin typeface="Times New Roman" panose="02020603050405020304" pitchFamily="18" charset="0"/>
+                <a:cs typeface="Times New Roman" panose="02020603050405020304" pitchFamily="18" charset="0"/>
+              </a:endParaRPr>
+            </a:p>
+          </p:txBody>
+        </p:sp>
+        <p:grpSp>
+          <p:nvGrpSpPr>
+            <p:cNvPr id="11" name="Group 10">
+              <a:extLst>
+                <a:ext uri="{FF2B5EF4-FFF2-40B4-BE49-F238E27FC236}">
+                  <a16:creationId xmlns:a16="http://schemas.microsoft.com/office/drawing/2014/main" id="{9EA04038-6C72-AD41-88D8-A4BF8EBE1674}"/>
+                </a:ext>
+              </a:extLst>
+            </p:cNvPr>
+            <p:cNvGrpSpPr/>
+            <p:nvPr/>
+          </p:nvGrpSpPr>
+          <p:grpSpPr>
+            <a:xfrm>
+              <a:off x="5969000" y="7949780"/>
+              <a:ext cx="1503360" cy="583686"/>
+              <a:chOff x="5969000" y="7949780"/>
+              <a:chExt cx="1503360" cy="583686"/>
+            </a:xfrm>
+          </p:grpSpPr>
+          <p:sp>
+            <p:nvSpPr>
+              <p:cNvPr id="10" name="Rectangle 9">
+                <a:extLst>
+                  <a:ext uri="{FF2B5EF4-FFF2-40B4-BE49-F238E27FC236}">
+                    <a16:creationId xmlns:a16="http://schemas.microsoft.com/office/drawing/2014/main" id="{4F66BE1E-E0CF-B445-B009-8B4F2A9C3DD7}"/>
+                  </a:ext>
+                </a:extLst>
+              </p:cNvPr>
+              <p:cNvSpPr/>
+              <p:nvPr/>
+            </p:nvSpPr>
+            <p:spPr>
+              <a:xfrm>
+                <a:off x="6121400" y="8064500"/>
+                <a:ext cx="1350960" cy="444500"/>
+              </a:xfrm>
+              <a:prstGeom prst="rect">
+                <a:avLst/>
+              </a:prstGeom>
+              <a:solidFill>
+                <a:schemeClr val="bg1"/>
+              </a:solidFill>
+              <a:ln>
+                <a:solidFill>
+                  <a:schemeClr val="bg1"/>
+                </a:solidFill>
+              </a:ln>
+            </p:spPr>
+            <p:style>
+              <a:lnRef idx="2">
+                <a:schemeClr val="accent1">
+                  <a:shade val="50000"/>
+                </a:schemeClr>
+              </a:lnRef>
+              <a:fillRef idx="1">
+                <a:schemeClr val="accent1"/>
+              </a:fillRef>
+              <a:effectRef idx="0">
+                <a:schemeClr val="accent1"/>
+              </a:effectRef>
+              <a:fontRef idx="minor">
+                <a:schemeClr val="lt1"/>
+              </a:fontRef>
+            </p:style>
+            <p:txBody>
+              <a:bodyPr rtlCol="0" anchor="ctr"/>
+              <a:lstStyle/>
+              <a:p>
+                <a:pPr algn="ctr"/>
+                <a:endParaRPr lang="en-US"/>
+              </a:p>
+            </p:txBody>
+          </p:sp>
+          <p:sp>
+            <p:nvSpPr>
+              <p:cNvPr id="9" name="TextBox 8">
+                <a:extLst>
+                  <a:ext uri="{FF2B5EF4-FFF2-40B4-BE49-F238E27FC236}">
+                    <a16:creationId xmlns:a16="http://schemas.microsoft.com/office/drawing/2014/main" id="{2BFFDF34-877A-6D4E-A243-A62A962A1BA9}"/>
+                  </a:ext>
+                </a:extLst>
+              </p:cNvPr>
+              <p:cNvSpPr txBox="1"/>
+              <p:nvPr/>
+            </p:nvSpPr>
+            <p:spPr>
+              <a:xfrm>
+                <a:off x="5969000" y="7949780"/>
+                <a:ext cx="1503360" cy="583686"/>
+              </a:xfrm>
+              <a:prstGeom prst="rect">
+                <a:avLst/>
+              </a:prstGeom>
+              <a:noFill/>
+            </p:spPr>
+            <p:txBody>
+              <a:bodyPr wrap="none" rtlCol="0">
+                <a:spAutoFit/>
+              </a:bodyPr>
+              <a:lstStyle/>
+              <a:p>
+                <a:r>
+                  <a:rPr lang="uk-UA" dirty="0">
+                    <a:latin typeface="Times New Roman" panose="02020603050405020304" pitchFamily="18" charset="0"/>
+                    <a:cs typeface="Times New Roman" panose="02020603050405020304" pitchFamily="18" charset="0"/>
+                  </a:rPr>
+                  <a:t>протеїн</a:t>
+                </a:r>
+                <a:endParaRPr lang="en-US" dirty="0">
+                  <a:latin typeface="Times New Roman" panose="02020603050405020304" pitchFamily="18" charset="0"/>
+                  <a:cs typeface="Times New Roman" panose="02020603050405020304" pitchFamily="18" charset="0"/>
+                </a:endParaRPr>
+              </a:p>
+            </p:txBody>
+          </p:sp>
+        </p:grpSp>
+        <p:grpSp>
+          <p:nvGrpSpPr>
+            <p:cNvPr id="12" name="Group 11">
+              <a:extLst>
+                <a:ext uri="{FF2B5EF4-FFF2-40B4-BE49-F238E27FC236}">
+                  <a16:creationId xmlns:a16="http://schemas.microsoft.com/office/drawing/2014/main" id="{F0775E93-FBBD-5C49-B52D-1212A48F798A}"/>
+                </a:ext>
+              </a:extLst>
+            </p:cNvPr>
+            <p:cNvGrpSpPr/>
+            <p:nvPr/>
+          </p:nvGrpSpPr>
+          <p:grpSpPr>
+            <a:xfrm>
+              <a:off x="5918200" y="9295560"/>
+              <a:ext cx="1503360" cy="583686"/>
+              <a:chOff x="5969000" y="7949780"/>
+              <a:chExt cx="1503360" cy="583686"/>
+            </a:xfrm>
+          </p:grpSpPr>
+          <p:sp>
+            <p:nvSpPr>
+              <p:cNvPr id="13" name="Rectangle 12">
+                <a:extLst>
+                  <a:ext uri="{FF2B5EF4-FFF2-40B4-BE49-F238E27FC236}">
+                    <a16:creationId xmlns:a16="http://schemas.microsoft.com/office/drawing/2014/main" id="{100C11FE-A24F-A840-96F6-B8F7E7C26EBA}"/>
+                  </a:ext>
+                </a:extLst>
+              </p:cNvPr>
+              <p:cNvSpPr/>
+              <p:nvPr/>
+            </p:nvSpPr>
+            <p:spPr>
+              <a:xfrm>
+                <a:off x="6121400" y="8064500"/>
+                <a:ext cx="1350960" cy="444500"/>
+              </a:xfrm>
+              <a:prstGeom prst="rect">
+                <a:avLst/>
+              </a:prstGeom>
+              <a:solidFill>
+                <a:schemeClr val="bg1"/>
+              </a:solidFill>
+              <a:ln>
+                <a:solidFill>
+                  <a:schemeClr val="bg1"/>
+                </a:solidFill>
+              </a:ln>
+            </p:spPr>
+            <p:style>
+              <a:lnRef idx="2">
+                <a:schemeClr val="accent1">
+                  <a:shade val="50000"/>
+                </a:schemeClr>
+              </a:lnRef>
+              <a:fillRef idx="1">
+                <a:schemeClr val="accent1"/>
+              </a:fillRef>
+              <a:effectRef idx="0">
+                <a:schemeClr val="accent1"/>
+              </a:effectRef>
+              <a:fontRef idx="minor">
+                <a:schemeClr val="lt1"/>
+              </a:fontRef>
+            </p:style>
+            <p:txBody>
+              <a:bodyPr rtlCol="0" anchor="ctr"/>
+              <a:lstStyle/>
+              <a:p>
+                <a:pPr algn="ctr"/>
+                <a:endParaRPr lang="en-US"/>
+              </a:p>
+            </p:txBody>
+          </p:sp>
+          <p:sp>
+            <p:nvSpPr>
+              <p:cNvPr id="14" name="TextBox 13">
+                <a:extLst>
+                  <a:ext uri="{FF2B5EF4-FFF2-40B4-BE49-F238E27FC236}">
+                    <a16:creationId xmlns:a16="http://schemas.microsoft.com/office/drawing/2014/main" id="{C237A0F4-0BF5-E547-9914-BF6C616999EC}"/>
+                  </a:ext>
+                </a:extLst>
+              </p:cNvPr>
+              <p:cNvSpPr txBox="1"/>
+              <p:nvPr/>
+            </p:nvSpPr>
+            <p:spPr>
+              <a:xfrm>
+                <a:off x="5969000" y="7949780"/>
+                <a:ext cx="1503360" cy="583686"/>
+              </a:xfrm>
+              <a:prstGeom prst="rect">
+                <a:avLst/>
+              </a:prstGeom>
+              <a:noFill/>
+            </p:spPr>
+            <p:txBody>
+              <a:bodyPr wrap="none" rtlCol="0">
+                <a:spAutoFit/>
+              </a:bodyPr>
+              <a:lstStyle/>
+              <a:p>
+                <a:r>
+                  <a:rPr lang="uk-UA" dirty="0">
+                    <a:latin typeface="Times New Roman" panose="02020603050405020304" pitchFamily="18" charset="0"/>
+                    <a:cs typeface="Times New Roman" panose="02020603050405020304" pitchFamily="18" charset="0"/>
+                  </a:rPr>
+                  <a:t>протеїн</a:t>
+                </a:r>
+                <a:endParaRPr lang="en-US" dirty="0">
+                  <a:latin typeface="Times New Roman" panose="02020603050405020304" pitchFamily="18" charset="0"/>
+                  <a:cs typeface="Times New Roman" panose="02020603050405020304" pitchFamily="18" charset="0"/>
+                </a:endParaRPr>
+              </a:p>
+            </p:txBody>
+          </p:sp>
+        </p:grpSp>
+        <p:grpSp>
+          <p:nvGrpSpPr>
+            <p:cNvPr id="15" name="Group 14">
+              <a:extLst>
+                <a:ext uri="{FF2B5EF4-FFF2-40B4-BE49-F238E27FC236}">
+                  <a16:creationId xmlns:a16="http://schemas.microsoft.com/office/drawing/2014/main" id="{A79007F8-5300-AA4D-B9C9-0A4D2FD72ECE}"/>
+                </a:ext>
+              </a:extLst>
+            </p:cNvPr>
+            <p:cNvGrpSpPr/>
+            <p:nvPr/>
+          </p:nvGrpSpPr>
+          <p:grpSpPr>
+            <a:xfrm>
+              <a:off x="5918200" y="10616874"/>
+              <a:ext cx="1503360" cy="583686"/>
+              <a:chOff x="5969000" y="7949780"/>
+              <a:chExt cx="1503360" cy="583686"/>
+            </a:xfrm>
+          </p:grpSpPr>
+          <p:sp>
+            <p:nvSpPr>
+              <p:cNvPr id="16" name="Rectangle 15">
+                <a:extLst>
+                  <a:ext uri="{FF2B5EF4-FFF2-40B4-BE49-F238E27FC236}">
+                    <a16:creationId xmlns:a16="http://schemas.microsoft.com/office/drawing/2014/main" id="{E625B42E-BF9B-1745-9C2B-3CA61858FA87}"/>
+                  </a:ext>
+                </a:extLst>
+              </p:cNvPr>
+              <p:cNvSpPr/>
+              <p:nvPr/>
+            </p:nvSpPr>
+            <p:spPr>
+              <a:xfrm>
+                <a:off x="6121400" y="8064500"/>
+                <a:ext cx="1350960" cy="444500"/>
+              </a:xfrm>
+              <a:prstGeom prst="rect">
+                <a:avLst/>
+              </a:prstGeom>
+              <a:solidFill>
+                <a:schemeClr val="bg1"/>
+              </a:solidFill>
+              <a:ln>
+                <a:solidFill>
+                  <a:schemeClr val="bg1"/>
+                </a:solidFill>
+              </a:ln>
+            </p:spPr>
+            <p:style>
+              <a:lnRef idx="2">
+                <a:schemeClr val="accent1">
+                  <a:shade val="50000"/>
+                </a:schemeClr>
+              </a:lnRef>
+              <a:fillRef idx="1">
+                <a:schemeClr val="accent1"/>
+              </a:fillRef>
+              <a:effectRef idx="0">
+                <a:schemeClr val="accent1"/>
+              </a:effectRef>
+              <a:fontRef idx="minor">
+                <a:schemeClr val="lt1"/>
+              </a:fontRef>
+            </p:style>
+            <p:txBody>
+              <a:bodyPr rtlCol="0" anchor="ctr"/>
+              <a:lstStyle/>
+              <a:p>
+                <a:pPr algn="ctr"/>
+                <a:endParaRPr lang="en-US"/>
+              </a:p>
+            </p:txBody>
+          </p:sp>
+          <p:sp>
+            <p:nvSpPr>
+              <p:cNvPr id="17" name="TextBox 16">
+                <a:extLst>
+                  <a:ext uri="{FF2B5EF4-FFF2-40B4-BE49-F238E27FC236}">
+                    <a16:creationId xmlns:a16="http://schemas.microsoft.com/office/drawing/2014/main" id="{C6973BBA-B9C1-0F4C-B7FD-F12B026C6A04}"/>
+                  </a:ext>
+                </a:extLst>
+              </p:cNvPr>
+              <p:cNvSpPr txBox="1"/>
+              <p:nvPr/>
+            </p:nvSpPr>
+            <p:spPr>
+              <a:xfrm>
+                <a:off x="5969000" y="7949780"/>
+                <a:ext cx="1503360" cy="583686"/>
+              </a:xfrm>
+              <a:prstGeom prst="rect">
+                <a:avLst/>
+              </a:prstGeom>
+              <a:noFill/>
+            </p:spPr>
+            <p:txBody>
+              <a:bodyPr wrap="none" rtlCol="0">
+                <a:spAutoFit/>
+              </a:bodyPr>
+              <a:lstStyle/>
+              <a:p>
+                <a:r>
+                  <a:rPr lang="uk-UA" dirty="0">
+                    <a:latin typeface="Times New Roman" panose="02020603050405020304" pitchFamily="18" charset="0"/>
+                    <a:cs typeface="Times New Roman" panose="02020603050405020304" pitchFamily="18" charset="0"/>
+                  </a:rPr>
+                  <a:t>протеїн</a:t>
+                </a:r>
+                <a:endParaRPr lang="en-US" dirty="0">
+                  <a:latin typeface="Times New Roman" panose="02020603050405020304" pitchFamily="18" charset="0"/>
+                  <a:cs typeface="Times New Roman" panose="02020603050405020304" pitchFamily="18" charset="0"/>
+                </a:endParaRPr>
+              </a:p>
+            </p:txBody>
+          </p:sp>
+        </p:grpSp>
+      </p:grpSp>
+    </p:spTree>
+    <p:extLst>
+      <p:ext uri="{BB962C8B-B14F-4D97-AF65-F5344CB8AC3E}">
+        <p14:creationId xmlns:p14="http://schemas.microsoft.com/office/powerpoint/2010/main" val="3172113250"/>
+      </p:ext>
+    </p:extLst>
+  </p:cSld>
+  <p:clrMapOvr>
+    <a:masterClrMapping/>
+  </p:clrMapOvr>
+</p:sld>
+</file>
+
 <file path=ppt/theme/theme1.xml><?xml version="1.0" encoding="utf-8"?>
 <a:theme xmlns:a="http://schemas.openxmlformats.org/drawingml/2006/main" name="Office Theme">
   <a:themeElements>

</xml_diff>